<commit_message>
another update before deadline; will continue to work on it after
</commit_message>
<xml_diff>
--- a/presentation_spotify_YC.pptx
+++ b/presentation_spotify_YC.pptx
@@ -4709,15 +4709,7 @@
           <a:p>
             <a:r>
               <a:rPr lang="en-US" sz="2400" dirty="0"/>
-              <a:t>Music </a:t>
-            </a:r>
-            <a:r>
-              <a:rPr lang="en-US" sz="2400"/>
-              <a:t>streaming performance </a:t>
-            </a:r>
-            <a:r>
-              <a:rPr lang="en-US" sz="2400" dirty="0"/>
-              <a:t>took a turn for the worse after the CoVID-19 outbreak started in 2020</a:t>
+              <a:t>Avg weekly music streams went down after the CoVID-19 outbreak started in 2020</a:t>
             </a:r>
           </a:p>
         </p:txBody>
@@ -4888,40 +4880,55 @@
             <p:ph type="title"/>
           </p:nvPr>
         </p:nvSpPr>
-        <p:spPr/>
-        <p:txBody>
-          <a:bodyPr/>
-          <a:lstStyle/>
-          <a:p>
-            <a:endParaRPr lang="en-US" dirty="0"/>
-          </a:p>
-        </p:txBody>
-      </p:sp>
-      <p:sp>
-        <p:nvSpPr>
-          <p:cNvPr id="3" name="Content Placeholder 2">
+        <p:spPr>
+          <a:xfrm>
+            <a:off x="2611808" y="808056"/>
+            <a:ext cx="7958331" cy="673611"/>
+          </a:xfrm>
+        </p:spPr>
+        <p:txBody>
+          <a:bodyPr>
+            <a:normAutofit fontScale="90000"/>
+          </a:bodyPr>
+          <a:lstStyle/>
+          <a:p>
+            <a:r>
+              <a:rPr lang="en-US" sz="2400" dirty="0"/>
+              <a:t>Fridays, Saturdays, and Mondays were the days with most new entries into the top 200 chart</a:t>
+            </a:r>
+          </a:p>
+        </p:txBody>
+      </p:sp>
+      <p:pic>
+        <p:nvPicPr>
+          <p:cNvPr id="4" name="Picture 3">
             <a:extLst>
               <a:ext uri="{FF2B5EF4-FFF2-40B4-BE49-F238E27FC236}">
-                <a16:creationId xmlns:a16="http://schemas.microsoft.com/office/drawing/2014/main" id="{4FB2D565-9CFA-4E1E-937B-F33E38965F12}"/>
+                <a16:creationId xmlns:a16="http://schemas.microsoft.com/office/drawing/2014/main" id="{7604B2E8-C187-475F-BA68-0FC60345CAC3}"/>
               </a:ext>
             </a:extLst>
           </p:cNvPr>
-          <p:cNvSpPr>
-            <a:spLocks noGrp="1"/>
-          </p:cNvSpPr>
-          <p:nvPr>
-            <p:ph idx="1"/>
-          </p:nvPr>
-        </p:nvSpPr>
-        <p:spPr/>
-        <p:txBody>
-          <a:bodyPr/>
-          <a:lstStyle/>
-          <a:p>
-            <a:endParaRPr lang="en-US"/>
-          </a:p>
-        </p:txBody>
-      </p:sp>
+          <p:cNvPicPr>
+            <a:picLocks noChangeAspect="1"/>
+          </p:cNvPicPr>
+          <p:nvPr/>
+        </p:nvPicPr>
+        <p:blipFill>
+          <a:blip r:embed="rId2"/>
+          <a:stretch>
+            <a:fillRect/>
+          </a:stretch>
+        </p:blipFill>
+        <p:spPr>
+          <a:xfrm>
+            <a:off x="2248464" y="1651150"/>
+            <a:ext cx="8321675" cy="4466015"/>
+          </a:xfrm>
+          <a:prstGeom prst="rect">
+            <a:avLst/>
+          </a:prstGeom>
+        </p:spPr>
+      </p:pic>
     </p:spTree>
     <p:extLst>
       <p:ext uri="{BB962C8B-B14F-4D97-AF65-F5344CB8AC3E}">

</xml_diff>

<commit_message>
revisions for presentation; more to come
</commit_message>
<xml_diff>
--- a/presentation_spotify_YC.pptx
+++ b/presentation_spotify_YC.pptx
@@ -8,10 +8,16 @@
     <p:sldId id="256" r:id="rId2"/>
     <p:sldId id="263" r:id="rId3"/>
     <p:sldId id="258" r:id="rId4"/>
-    <p:sldId id="259" r:id="rId5"/>
-    <p:sldId id="260" r:id="rId6"/>
-    <p:sldId id="261" r:id="rId7"/>
-    <p:sldId id="262" r:id="rId8"/>
+    <p:sldId id="269" r:id="rId5"/>
+    <p:sldId id="268" r:id="rId6"/>
+    <p:sldId id="267" r:id="rId7"/>
+    <p:sldId id="259" r:id="rId8"/>
+    <p:sldId id="260" r:id="rId9"/>
+    <p:sldId id="261" r:id="rId10"/>
+    <p:sldId id="271" r:id="rId11"/>
+    <p:sldId id="273" r:id="rId12"/>
+    <p:sldId id="270" r:id="rId13"/>
+    <p:sldId id="272" r:id="rId14"/>
   </p:sldIdLst>
   <p:sldSz cx="12192000" cy="6858000"/>
   <p:notesSz cx="6858000" cy="9144000"/>
@@ -110,6 +116,11 @@
       </a:defRPr>
     </a:lvl9pPr>
   </p:defaultTextStyle>
+  <p:extLst>
+    <p:ext uri="{EFAFB233-063F-42B5-8137-9DF3F51BA10A}">
+      <p15:sldGuideLst xmlns:p15="http://schemas.microsoft.com/office/powerpoint/2012/main"/>
+    </p:ext>
+  </p:extLst>
 </p:presentation>
 </file>
 
@@ -330,7 +341,7 @@
           <a:p>
             <a:fld id="{9AB3A824-1A51-4B26-AD58-A6D8E14F6C04}" type="datetimeFigureOut">
               <a:rPr lang="en-US" dirty="0"/>
-              <a:t>11/1/2020</a:t>
+              <a:t>11/3/2020</a:t>
             </a:fld>
             <a:endParaRPr lang="en-US" dirty="0"/>
           </a:p>
@@ -664,7 +675,7 @@
           <a:p>
             <a:fld id="{D857E33E-8B18-4087-B112-809917729534}" type="datetimeFigureOut">
               <a:rPr lang="en-US" dirty="0"/>
-              <a:t>11/1/2020</a:t>
+              <a:t>11/3/2020</a:t>
             </a:fld>
             <a:endParaRPr lang="en-US" dirty="0"/>
           </a:p>
@@ -966,7 +977,7 @@
           <a:p>
             <a:fld id="{D3FFE419-2371-464F-8239-3959401C3561}" type="datetimeFigureOut">
               <a:rPr lang="en-US" dirty="0"/>
-              <a:t>11/1/2020</a:t>
+              <a:t>11/3/2020</a:t>
             </a:fld>
             <a:endParaRPr lang="en-US" dirty="0"/>
           </a:p>
@@ -1213,7 +1224,7 @@
           <a:p>
             <a:fld id="{97D162C4-EDD9-4389-A98B-B87ECEA2A816}" type="datetimeFigureOut">
               <a:rPr lang="en-US" dirty="0"/>
-              <a:t>11/1/2020</a:t>
+              <a:t>11/3/2020</a:t>
             </a:fld>
             <a:endParaRPr lang="en-US" dirty="0"/>
           </a:p>
@@ -1620,7 +1631,7 @@
           <a:p>
             <a:fld id="{3E5059C3-6A89-4494-99FF-5A4D6FFD50EB}" type="datetimeFigureOut">
               <a:rPr lang="en-US" dirty="0"/>
-              <a:t>11/1/2020</a:t>
+              <a:t>11/3/2020</a:t>
             </a:fld>
             <a:endParaRPr lang="en-US" dirty="0"/>
           </a:p>
@@ -1934,7 +1945,7 @@
           <a:p>
             <a:fld id="{CA954B2F-12DE-47F5-8894-472B206D2E1E}" type="datetimeFigureOut">
               <a:rPr lang="en-US" dirty="0"/>
-              <a:t>11/1/2020</a:t>
+              <a:t>11/3/2020</a:t>
             </a:fld>
             <a:endParaRPr lang="en-US" dirty="0"/>
           </a:p>
@@ -2478,7 +2489,7 @@
           <a:p>
             <a:fld id="{3F30E46F-7819-4ACF-B48B-48222C2ACC88}" type="datetimeFigureOut">
               <a:rPr lang="en-US" dirty="0"/>
-              <a:t>11/1/2020</a:t>
+              <a:t>11/3/2020</a:t>
             </a:fld>
             <a:endParaRPr lang="en-US" dirty="0"/>
           </a:p>
@@ -2673,7 +2684,7 @@
           <a:p>
             <a:fld id="{1FAF3416-4057-4DAA-829D-4CA07428D088}" type="datetimeFigureOut">
               <a:rPr lang="en-US" dirty="0"/>
-              <a:t>11/1/2020</a:t>
+              <a:t>11/3/2020</a:t>
             </a:fld>
             <a:endParaRPr lang="en-US" dirty="0"/>
           </a:p>
@@ -2886,7 +2897,7 @@
           <a:p>
             <a:fld id="{921D9284-D300-4297-87F7-E791DCC15DB1}" type="datetimeFigureOut">
               <a:rPr lang="en-US" dirty="0"/>
-              <a:t>11/1/2020</a:t>
+              <a:t>11/3/2020</a:t>
             </a:fld>
             <a:endParaRPr lang="en-US" dirty="0"/>
           </a:p>
@@ -3255,7 +3266,7 @@
           <a:p>
             <a:fld id="{37D525BB-DA17-4BA0-B3C8-3AC3ABC827E6}" type="datetimeFigureOut">
               <a:rPr lang="en-US" dirty="0"/>
-              <a:t>11/1/2020</a:t>
+              <a:t>11/3/2020</a:t>
             </a:fld>
             <a:endParaRPr lang="en-US" dirty="0"/>
           </a:p>
@@ -3658,7 +3669,7 @@
           <a:p>
             <a:fld id="{B16C4C9A-3960-41CF-A4E9-2A8FB932454B}" type="datetimeFigureOut">
               <a:rPr lang="en-US" dirty="0"/>
-              <a:t>11/1/2020</a:t>
+              <a:t>11/3/2020</a:t>
             </a:fld>
             <a:endParaRPr lang="en-US" dirty="0"/>
           </a:p>
@@ -3969,7 +3980,7 @@
           <a:p>
             <a:fld id="{3CBC1C18-307B-4F68-A007-B5B542270E8D}" type="datetimeFigureOut">
               <a:rPr lang="en-US" dirty="0"/>
-              <a:t>11/1/2020</a:t>
+              <a:t>11/3/2020</a:t>
             </a:fld>
             <a:endParaRPr lang="en-US" dirty="0"/>
           </a:p>
@@ -4554,10 +4565,698 @@
           </a:p>
         </p:txBody>
       </p:sp>
+      <p:sp>
+        <p:nvSpPr>
+          <p:cNvPr id="4" name="Subtitle 2">
+            <a:extLst>
+              <a:ext uri="{FF2B5EF4-FFF2-40B4-BE49-F238E27FC236}">
+                <a16:creationId xmlns:a16="http://schemas.microsoft.com/office/drawing/2014/main" id="{77A7191B-EBD4-4923-892F-ACBF7B7353EB}"/>
+              </a:ext>
+            </a:extLst>
+          </p:cNvPr>
+          <p:cNvSpPr txBox="1">
+            <a:spLocks/>
+          </p:cNvSpPr>
+          <p:nvPr/>
+        </p:nvSpPr>
+        <p:spPr>
+          <a:xfrm>
+            <a:off x="1781273" y="5344642"/>
+            <a:ext cx="6625726" cy="381001"/>
+          </a:xfrm>
+          <a:prstGeom prst="rect">
+            <a:avLst/>
+          </a:prstGeom>
+        </p:spPr>
+        <p:txBody>
+          <a:bodyPr vert="horz" lIns="91440" tIns="0" rIns="91440" bIns="45720" rtlCol="0" anchor="b">
+            <a:normAutofit/>
+          </a:bodyPr>
+          <a:lstStyle>
+            <a:lvl1pPr marL="0" indent="0" algn="r" defTabSz="914400" rtl="0" eaLnBrk="1" latinLnBrk="0" hangingPunct="1">
+              <a:lnSpc>
+                <a:spcPct val="120000"/>
+              </a:lnSpc>
+              <a:spcBef>
+                <a:spcPts val="1000"/>
+              </a:spcBef>
+              <a:spcAft>
+                <a:spcPts val="600"/>
+              </a:spcAft>
+              <a:buClr>
+                <a:schemeClr val="accent6"/>
+              </a:buClr>
+              <a:buSzPct val="90000"/>
+              <a:buFont typeface="Wingdings" panose="05000000000000000000" pitchFamily="2" charset="2"/>
+              <a:buNone/>
+              <a:defRPr sz="1800" b="0" kern="1200">
+                <a:solidFill>
+                  <a:schemeClr val="tx1"/>
+                </a:solidFill>
+                <a:effectLst/>
+                <a:latin typeface="+mn-lt"/>
+                <a:ea typeface="+mn-ea"/>
+                <a:cs typeface="+mn-cs"/>
+              </a:defRPr>
+            </a:lvl1pPr>
+            <a:lvl2pPr marL="457200" indent="0" algn="ctr" defTabSz="914400" rtl="0" eaLnBrk="1" latinLnBrk="0" hangingPunct="1">
+              <a:lnSpc>
+                <a:spcPct val="120000"/>
+              </a:lnSpc>
+              <a:spcBef>
+                <a:spcPts val="500"/>
+              </a:spcBef>
+              <a:spcAft>
+                <a:spcPts val="600"/>
+              </a:spcAft>
+              <a:buClr>
+                <a:schemeClr val="accent6"/>
+              </a:buClr>
+              <a:buSzPct val="90000"/>
+              <a:buFont typeface="Wingdings" panose="05000000000000000000" pitchFamily="2" charset="2"/>
+              <a:buNone/>
+              <a:defRPr sz="1800" kern="1200">
+                <a:solidFill>
+                  <a:schemeClr val="tx1"/>
+                </a:solidFill>
+                <a:effectLst/>
+                <a:latin typeface="+mn-lt"/>
+                <a:ea typeface="+mn-ea"/>
+                <a:cs typeface="+mn-cs"/>
+              </a:defRPr>
+            </a:lvl2pPr>
+            <a:lvl3pPr marL="914400" indent="0" algn="ctr" defTabSz="914400" rtl="0" eaLnBrk="1" latinLnBrk="0" hangingPunct="1">
+              <a:lnSpc>
+                <a:spcPct val="120000"/>
+              </a:lnSpc>
+              <a:spcBef>
+                <a:spcPts val="500"/>
+              </a:spcBef>
+              <a:spcAft>
+                <a:spcPts val="600"/>
+              </a:spcAft>
+              <a:buClr>
+                <a:schemeClr val="accent6"/>
+              </a:buClr>
+              <a:buSzPct val="90000"/>
+              <a:buFont typeface="Wingdings" panose="05000000000000000000" pitchFamily="2" charset="2"/>
+              <a:buNone/>
+              <a:defRPr sz="1800" kern="1200">
+                <a:solidFill>
+                  <a:schemeClr val="tx1"/>
+                </a:solidFill>
+                <a:effectLst/>
+                <a:latin typeface="+mn-lt"/>
+                <a:ea typeface="+mn-ea"/>
+                <a:cs typeface="+mn-cs"/>
+              </a:defRPr>
+            </a:lvl3pPr>
+            <a:lvl4pPr marL="1371600" indent="0" algn="ctr" defTabSz="914400" rtl="0" eaLnBrk="1" latinLnBrk="0" hangingPunct="1">
+              <a:lnSpc>
+                <a:spcPct val="120000"/>
+              </a:lnSpc>
+              <a:spcBef>
+                <a:spcPts val="500"/>
+              </a:spcBef>
+              <a:spcAft>
+                <a:spcPts val="600"/>
+              </a:spcAft>
+              <a:buClr>
+                <a:schemeClr val="accent6"/>
+              </a:buClr>
+              <a:buSzPct val="90000"/>
+              <a:buFont typeface="Wingdings" panose="05000000000000000000" pitchFamily="2" charset="2"/>
+              <a:buNone/>
+              <a:defRPr sz="1600" kern="1200">
+                <a:solidFill>
+                  <a:schemeClr val="tx1"/>
+                </a:solidFill>
+                <a:effectLst/>
+                <a:latin typeface="+mn-lt"/>
+                <a:ea typeface="+mn-ea"/>
+                <a:cs typeface="+mn-cs"/>
+              </a:defRPr>
+            </a:lvl4pPr>
+            <a:lvl5pPr marL="1828800" indent="0" algn="ctr" defTabSz="914400" rtl="0" eaLnBrk="1" latinLnBrk="0" hangingPunct="1">
+              <a:lnSpc>
+                <a:spcPct val="120000"/>
+              </a:lnSpc>
+              <a:spcBef>
+                <a:spcPts val="500"/>
+              </a:spcBef>
+              <a:spcAft>
+                <a:spcPts val="600"/>
+              </a:spcAft>
+              <a:buClr>
+                <a:schemeClr val="accent6"/>
+              </a:buClr>
+              <a:buSzPct val="90000"/>
+              <a:buFont typeface="Wingdings" panose="05000000000000000000" pitchFamily="2" charset="2"/>
+              <a:buNone/>
+              <a:defRPr sz="1600" kern="1200">
+                <a:solidFill>
+                  <a:schemeClr val="tx1"/>
+                </a:solidFill>
+                <a:effectLst/>
+                <a:latin typeface="+mn-lt"/>
+                <a:ea typeface="+mn-ea"/>
+                <a:cs typeface="+mn-cs"/>
+              </a:defRPr>
+            </a:lvl5pPr>
+            <a:lvl6pPr marL="2286000" indent="0" algn="ctr" defTabSz="914400" rtl="0" eaLnBrk="1" latinLnBrk="0" hangingPunct="1">
+              <a:lnSpc>
+                <a:spcPct val="120000"/>
+              </a:lnSpc>
+              <a:spcBef>
+                <a:spcPts val="500"/>
+              </a:spcBef>
+              <a:spcAft>
+                <a:spcPts val="600"/>
+              </a:spcAft>
+              <a:buClr>
+                <a:schemeClr val="accent6"/>
+              </a:buClr>
+              <a:buSzPct val="90000"/>
+              <a:buFont typeface="Wingdings" panose="05000000000000000000" pitchFamily="2" charset="2"/>
+              <a:buNone/>
+              <a:defRPr sz="1600" kern="1200" baseline="0">
+                <a:solidFill>
+                  <a:schemeClr val="tx1"/>
+                </a:solidFill>
+                <a:effectLst/>
+                <a:latin typeface="+mn-lt"/>
+                <a:ea typeface="+mn-ea"/>
+                <a:cs typeface="+mn-cs"/>
+              </a:defRPr>
+            </a:lvl6pPr>
+            <a:lvl7pPr marL="2743200" indent="0" algn="ctr" defTabSz="914400" rtl="0" eaLnBrk="1" latinLnBrk="0" hangingPunct="1">
+              <a:lnSpc>
+                <a:spcPct val="120000"/>
+              </a:lnSpc>
+              <a:spcBef>
+                <a:spcPts val="500"/>
+              </a:spcBef>
+              <a:spcAft>
+                <a:spcPts val="600"/>
+              </a:spcAft>
+              <a:buClr>
+                <a:schemeClr val="accent6"/>
+              </a:buClr>
+              <a:buSzPct val="90000"/>
+              <a:buFont typeface="Wingdings" panose="05000000000000000000" pitchFamily="2" charset="2"/>
+              <a:buNone/>
+              <a:defRPr sz="1600" kern="1200" baseline="0">
+                <a:solidFill>
+                  <a:schemeClr val="tx1"/>
+                </a:solidFill>
+                <a:effectLst/>
+                <a:latin typeface="+mn-lt"/>
+                <a:ea typeface="+mn-ea"/>
+                <a:cs typeface="+mn-cs"/>
+              </a:defRPr>
+            </a:lvl7pPr>
+            <a:lvl8pPr marL="3200400" indent="0" algn="ctr" defTabSz="914400" rtl="0" eaLnBrk="1" latinLnBrk="0" hangingPunct="1">
+              <a:lnSpc>
+                <a:spcPct val="120000"/>
+              </a:lnSpc>
+              <a:spcBef>
+                <a:spcPts val="500"/>
+              </a:spcBef>
+              <a:spcAft>
+                <a:spcPts val="600"/>
+              </a:spcAft>
+              <a:buClr>
+                <a:schemeClr val="accent6"/>
+              </a:buClr>
+              <a:buSzPct val="90000"/>
+              <a:buFont typeface="Wingdings" panose="05000000000000000000" pitchFamily="2" charset="2"/>
+              <a:buNone/>
+              <a:defRPr sz="1600" kern="1200" baseline="0">
+                <a:solidFill>
+                  <a:schemeClr val="tx1"/>
+                </a:solidFill>
+                <a:effectLst/>
+                <a:latin typeface="+mn-lt"/>
+                <a:ea typeface="+mn-ea"/>
+                <a:cs typeface="+mn-cs"/>
+              </a:defRPr>
+            </a:lvl8pPr>
+            <a:lvl9pPr marL="3657600" indent="0" algn="ctr" defTabSz="914400" rtl="0" eaLnBrk="1" latinLnBrk="0" hangingPunct="1">
+              <a:lnSpc>
+                <a:spcPct val="120000"/>
+              </a:lnSpc>
+              <a:spcBef>
+                <a:spcPts val="500"/>
+              </a:spcBef>
+              <a:spcAft>
+                <a:spcPts val="600"/>
+              </a:spcAft>
+              <a:buClr>
+                <a:schemeClr val="accent6"/>
+              </a:buClr>
+              <a:buSzPct val="90000"/>
+              <a:buFont typeface="Wingdings" panose="05000000000000000000" pitchFamily="2" charset="2"/>
+              <a:buNone/>
+              <a:defRPr sz="1600" kern="1200" baseline="0">
+                <a:solidFill>
+                  <a:schemeClr val="tx1"/>
+                </a:solidFill>
+                <a:effectLst/>
+                <a:latin typeface="+mn-lt"/>
+                <a:ea typeface="+mn-ea"/>
+                <a:cs typeface="+mn-cs"/>
+              </a:defRPr>
+            </a:lvl9pPr>
+          </a:lstStyle>
+          <a:p>
+            <a:r>
+              <a:rPr lang="en-US" dirty="0"/>
+              <a:t>Yi Cao</a:t>
+            </a:r>
+          </a:p>
+        </p:txBody>
+      </p:sp>
     </p:spTree>
     <p:extLst>
       <p:ext uri="{BB962C8B-B14F-4D97-AF65-F5344CB8AC3E}">
         <p14:creationId xmlns:p14="http://schemas.microsoft.com/office/powerpoint/2010/main" val="1203853801"/>
+      </p:ext>
+    </p:extLst>
+  </p:cSld>
+  <p:clrMapOvr>
+    <a:masterClrMapping/>
+  </p:clrMapOvr>
+</p:sld>
+</file>
+
+<file path=ppt/slides/slide10.xml><?xml version="1.0" encoding="utf-8"?>
+<p:sld xmlns:a="http://schemas.openxmlformats.org/drawingml/2006/main" xmlns:r="http://schemas.openxmlformats.org/officeDocument/2006/relationships" xmlns:p="http://schemas.openxmlformats.org/presentationml/2006/main">
+  <p:cSld>
+    <p:spTree>
+      <p:nvGrpSpPr>
+        <p:cNvPr id="1" name=""/>
+        <p:cNvGrpSpPr/>
+        <p:nvPr/>
+      </p:nvGrpSpPr>
+      <p:grpSpPr>
+        <a:xfrm>
+          <a:off x="0" y="0"/>
+          <a:ext cx="0" cy="0"/>
+          <a:chOff x="0" y="0"/>
+          <a:chExt cx="0" cy="0"/>
+        </a:xfrm>
+      </p:grpSpPr>
+      <p:sp>
+        <p:nvSpPr>
+          <p:cNvPr id="2" name="Title 1">
+            <a:extLst>
+              <a:ext uri="{FF2B5EF4-FFF2-40B4-BE49-F238E27FC236}">
+                <a16:creationId xmlns:a16="http://schemas.microsoft.com/office/drawing/2014/main" id="{47B5665C-A44E-494A-A95B-7294A8C877CA}"/>
+              </a:ext>
+            </a:extLst>
+          </p:cNvPr>
+          <p:cNvSpPr>
+            <a:spLocks noGrp="1"/>
+          </p:cNvSpPr>
+          <p:nvPr>
+            <p:ph type="title"/>
+          </p:nvPr>
+        </p:nvSpPr>
+        <p:spPr>
+          <a:xfrm>
+            <a:off x="2172750" y="808057"/>
+            <a:ext cx="8397390" cy="836185"/>
+          </a:xfrm>
+        </p:spPr>
+        <p:txBody>
+          <a:bodyPr>
+            <a:noAutofit/>
+          </a:bodyPr>
+          <a:lstStyle/>
+          <a:p>
+            <a:r>
+              <a:rPr lang="en-US" sz="2400" dirty="0"/>
+              <a:t>Pop Smoke album: 7/3/20; Juice </a:t>
+            </a:r>
+            <a:r>
+              <a:rPr lang="en-US" sz="2400" dirty="0" err="1"/>
+              <a:t>Wrld</a:t>
+            </a:r>
+            <a:r>
+              <a:rPr lang="en-US" sz="2400" dirty="0"/>
+              <a:t> album: 7/10/20;</a:t>
+            </a:r>
+            <a:br>
+              <a:rPr lang="en-US" sz="2400" dirty="0"/>
+            </a:br>
+            <a:r>
+              <a:rPr lang="en-US" sz="2400" dirty="0"/>
+              <a:t>Taylor Swift album: 7/24/20</a:t>
+            </a:r>
+            <a:br>
+              <a:rPr lang="en-US" sz="2400" dirty="0"/>
+            </a:br>
+            <a:r>
+              <a:rPr lang="en-US" sz="2400" dirty="0"/>
+              <a:t>   </a:t>
+            </a:r>
+          </a:p>
+        </p:txBody>
+      </p:sp>
+      <p:pic>
+        <p:nvPicPr>
+          <p:cNvPr id="5" name="Picture 4">
+            <a:extLst>
+              <a:ext uri="{FF2B5EF4-FFF2-40B4-BE49-F238E27FC236}">
+                <a16:creationId xmlns:a16="http://schemas.microsoft.com/office/drawing/2014/main" id="{140AC4FD-A383-4314-BC91-74AC391D0B0C}"/>
+              </a:ext>
+            </a:extLst>
+          </p:cNvPr>
+          <p:cNvPicPr>
+            <a:picLocks noChangeAspect="1"/>
+          </p:cNvPicPr>
+          <p:nvPr/>
+        </p:nvPicPr>
+        <p:blipFill>
+          <a:blip r:embed="rId2"/>
+          <a:stretch>
+            <a:fillRect/>
+          </a:stretch>
+        </p:blipFill>
+        <p:spPr>
+          <a:xfrm>
+            <a:off x="1971428" y="1644243"/>
+            <a:ext cx="8598712" cy="4405700"/>
+          </a:xfrm>
+          <a:prstGeom prst="rect">
+            <a:avLst/>
+          </a:prstGeom>
+        </p:spPr>
+      </p:pic>
+    </p:spTree>
+    <p:extLst>
+      <p:ext uri="{BB962C8B-B14F-4D97-AF65-F5344CB8AC3E}">
+        <p14:creationId xmlns:p14="http://schemas.microsoft.com/office/powerpoint/2010/main" val="2195826042"/>
+      </p:ext>
+    </p:extLst>
+  </p:cSld>
+  <p:clrMapOvr>
+    <a:masterClrMapping/>
+  </p:clrMapOvr>
+</p:sld>
+</file>
+
+<file path=ppt/slides/slide11.xml><?xml version="1.0" encoding="utf-8"?>
+<p:sld xmlns:a="http://schemas.openxmlformats.org/drawingml/2006/main" xmlns:r="http://schemas.openxmlformats.org/officeDocument/2006/relationships" xmlns:p="http://schemas.openxmlformats.org/presentationml/2006/main">
+  <p:cSld>
+    <p:spTree>
+      <p:nvGrpSpPr>
+        <p:cNvPr id="1" name=""/>
+        <p:cNvGrpSpPr/>
+        <p:nvPr/>
+      </p:nvGrpSpPr>
+      <p:grpSpPr>
+        <a:xfrm>
+          <a:off x="0" y="0"/>
+          <a:ext cx="0" cy="0"/>
+          <a:chOff x="0" y="0"/>
+          <a:chExt cx="0" cy="0"/>
+        </a:xfrm>
+      </p:grpSpPr>
+      <p:sp>
+        <p:nvSpPr>
+          <p:cNvPr id="2" name="Title 1">
+            <a:extLst>
+              <a:ext uri="{FF2B5EF4-FFF2-40B4-BE49-F238E27FC236}">
+                <a16:creationId xmlns:a16="http://schemas.microsoft.com/office/drawing/2014/main" id="{764B73EA-201A-46D1-97CC-C43820D01F0D}"/>
+              </a:ext>
+            </a:extLst>
+          </p:cNvPr>
+          <p:cNvSpPr>
+            <a:spLocks noGrp="1"/>
+          </p:cNvSpPr>
+          <p:nvPr>
+            <p:ph type="title"/>
+          </p:nvPr>
+        </p:nvSpPr>
+        <p:spPr>
+          <a:xfrm>
+            <a:off x="2611808" y="808057"/>
+            <a:ext cx="7958331" cy="559350"/>
+          </a:xfrm>
+        </p:spPr>
+        <p:txBody>
+          <a:bodyPr>
+            <a:normAutofit/>
+          </a:bodyPr>
+          <a:lstStyle/>
+          <a:p>
+            <a:r>
+              <a:rPr lang="en-US" sz="2400" dirty="0"/>
+              <a:t>Streaming giants raise the threshold of chart entry</a:t>
+            </a:r>
+          </a:p>
+        </p:txBody>
+      </p:sp>
+      <p:pic>
+        <p:nvPicPr>
+          <p:cNvPr id="4" name="Picture 3">
+            <a:extLst>
+              <a:ext uri="{FF2B5EF4-FFF2-40B4-BE49-F238E27FC236}">
+                <a16:creationId xmlns:a16="http://schemas.microsoft.com/office/drawing/2014/main" id="{2ED2FF5D-EFF2-4649-B73B-9653BAE004DE}"/>
+              </a:ext>
+            </a:extLst>
+          </p:cNvPr>
+          <p:cNvPicPr>
+            <a:picLocks noChangeAspect="1"/>
+          </p:cNvPicPr>
+          <p:nvPr/>
+        </p:nvPicPr>
+        <p:blipFill>
+          <a:blip r:embed="rId2"/>
+          <a:stretch>
+            <a:fillRect/>
+          </a:stretch>
+        </p:blipFill>
+        <p:spPr>
+          <a:xfrm>
+            <a:off x="1988191" y="1367407"/>
+            <a:ext cx="8581948" cy="4426153"/>
+          </a:xfrm>
+          <a:prstGeom prst="rect">
+            <a:avLst/>
+          </a:prstGeom>
+        </p:spPr>
+      </p:pic>
+    </p:spTree>
+    <p:extLst>
+      <p:ext uri="{BB962C8B-B14F-4D97-AF65-F5344CB8AC3E}">
+        <p14:creationId xmlns:p14="http://schemas.microsoft.com/office/powerpoint/2010/main" val="1540396693"/>
+      </p:ext>
+    </p:extLst>
+  </p:cSld>
+  <p:clrMapOvr>
+    <a:masterClrMapping/>
+  </p:clrMapOvr>
+</p:sld>
+</file>
+
+<file path=ppt/slides/slide12.xml><?xml version="1.0" encoding="utf-8"?>
+<p:sld xmlns:a="http://schemas.openxmlformats.org/drawingml/2006/main" xmlns:r="http://schemas.openxmlformats.org/officeDocument/2006/relationships" xmlns:p="http://schemas.openxmlformats.org/presentationml/2006/main">
+  <p:cSld>
+    <p:spTree>
+      <p:nvGrpSpPr>
+        <p:cNvPr id="1" name=""/>
+        <p:cNvGrpSpPr/>
+        <p:nvPr/>
+      </p:nvGrpSpPr>
+      <p:grpSpPr>
+        <a:xfrm>
+          <a:off x="0" y="0"/>
+          <a:ext cx="0" cy="0"/>
+          <a:chOff x="0" y="0"/>
+          <a:chExt cx="0" cy="0"/>
+        </a:xfrm>
+      </p:grpSpPr>
+      <p:sp>
+        <p:nvSpPr>
+          <p:cNvPr id="2" name="Title 1">
+            <a:extLst>
+              <a:ext uri="{FF2B5EF4-FFF2-40B4-BE49-F238E27FC236}">
+                <a16:creationId xmlns:a16="http://schemas.microsoft.com/office/drawing/2014/main" id="{08B1F074-431B-4F03-845A-8419D32B6017}"/>
+              </a:ext>
+            </a:extLst>
+          </p:cNvPr>
+          <p:cNvSpPr>
+            <a:spLocks noGrp="1"/>
+          </p:cNvSpPr>
+          <p:nvPr>
+            <p:ph type="title"/>
+          </p:nvPr>
+        </p:nvSpPr>
+        <p:spPr>
+          <a:xfrm>
+            <a:off x="2611808" y="808056"/>
+            <a:ext cx="7958331" cy="550961"/>
+          </a:xfrm>
+        </p:spPr>
+        <p:txBody>
+          <a:bodyPr>
+            <a:normAutofit/>
+          </a:bodyPr>
+          <a:lstStyle/>
+          <a:p>
+            <a:r>
+              <a:rPr lang="en-US" sz="2400" dirty="0"/>
+              <a:t>Recommendations for the smaller artists on Spotify</a:t>
+            </a:r>
+          </a:p>
+        </p:txBody>
+      </p:sp>
+      <p:sp>
+        <p:nvSpPr>
+          <p:cNvPr id="3" name="Content Placeholder 2">
+            <a:extLst>
+              <a:ext uri="{FF2B5EF4-FFF2-40B4-BE49-F238E27FC236}">
+                <a16:creationId xmlns:a16="http://schemas.microsoft.com/office/drawing/2014/main" id="{7319E9EE-08F2-49D3-81A7-BF2FC4B1D987}"/>
+              </a:ext>
+            </a:extLst>
+          </p:cNvPr>
+          <p:cNvSpPr>
+            <a:spLocks noGrp="1"/>
+          </p:cNvSpPr>
+          <p:nvPr>
+            <p:ph idx="1"/>
+          </p:nvPr>
+        </p:nvSpPr>
+        <p:spPr>
+          <a:xfrm>
+            <a:off x="2105637" y="1430086"/>
+            <a:ext cx="8464502" cy="3997828"/>
+          </a:xfrm>
+        </p:spPr>
+        <p:txBody>
+          <a:bodyPr/>
+          <a:lstStyle/>
+          <a:p>
+            <a:r>
+              <a:rPr lang="en-US" dirty="0"/>
+              <a:t>Audio consumption tends to be larger on Fridays and Saturdays, as well as during year-end holiday season; consider spending more resources on promoting your music then …</a:t>
+            </a:r>
+          </a:p>
+          <a:p>
+            <a:r>
+              <a:rPr lang="en-US" dirty="0"/>
+              <a:t>… unless there are album releases from the historical chart-toppers on the same day, then must avoid by planning around those artists’ release dates</a:t>
+            </a:r>
+          </a:p>
+          <a:p>
+            <a:endParaRPr lang="en-US" dirty="0"/>
+          </a:p>
+        </p:txBody>
+      </p:sp>
+    </p:spTree>
+    <p:extLst>
+      <p:ext uri="{BB962C8B-B14F-4D97-AF65-F5344CB8AC3E}">
+        <p14:creationId xmlns:p14="http://schemas.microsoft.com/office/powerpoint/2010/main" val="1422190051"/>
+      </p:ext>
+    </p:extLst>
+  </p:cSld>
+  <p:clrMapOvr>
+    <a:masterClrMapping/>
+  </p:clrMapOvr>
+</p:sld>
+</file>
+
+<file path=ppt/slides/slide13.xml><?xml version="1.0" encoding="utf-8"?>
+<p:sld xmlns:a="http://schemas.openxmlformats.org/drawingml/2006/main" xmlns:r="http://schemas.openxmlformats.org/officeDocument/2006/relationships" xmlns:p="http://schemas.openxmlformats.org/presentationml/2006/main">
+  <p:cSld>
+    <p:spTree>
+      <p:nvGrpSpPr>
+        <p:cNvPr id="1" name=""/>
+        <p:cNvGrpSpPr/>
+        <p:nvPr/>
+      </p:nvGrpSpPr>
+      <p:grpSpPr>
+        <a:xfrm>
+          <a:off x="0" y="0"/>
+          <a:ext cx="0" cy="0"/>
+          <a:chOff x="0" y="0"/>
+          <a:chExt cx="0" cy="0"/>
+        </a:xfrm>
+      </p:grpSpPr>
+      <p:sp>
+        <p:nvSpPr>
+          <p:cNvPr id="2" name="Title 1">
+            <a:extLst>
+              <a:ext uri="{FF2B5EF4-FFF2-40B4-BE49-F238E27FC236}">
+                <a16:creationId xmlns:a16="http://schemas.microsoft.com/office/drawing/2014/main" id="{EAE76274-24FA-47EF-AA83-007698744CD8}"/>
+              </a:ext>
+            </a:extLst>
+          </p:cNvPr>
+          <p:cNvSpPr>
+            <a:spLocks noGrp="1"/>
+          </p:cNvSpPr>
+          <p:nvPr>
+            <p:ph type="title"/>
+          </p:nvPr>
+        </p:nvSpPr>
+        <p:spPr/>
+        <p:txBody>
+          <a:bodyPr/>
+          <a:lstStyle/>
+          <a:p>
+            <a:r>
+              <a:rPr lang="en-US" dirty="0"/>
+              <a:t>Further Research</a:t>
+            </a:r>
+          </a:p>
+        </p:txBody>
+      </p:sp>
+      <p:sp>
+        <p:nvSpPr>
+          <p:cNvPr id="3" name="Content Placeholder 2">
+            <a:extLst>
+              <a:ext uri="{FF2B5EF4-FFF2-40B4-BE49-F238E27FC236}">
+                <a16:creationId xmlns:a16="http://schemas.microsoft.com/office/drawing/2014/main" id="{C9FF5DE5-CC09-40E6-82E9-9D1B5923E939}"/>
+              </a:ext>
+            </a:extLst>
+          </p:cNvPr>
+          <p:cNvSpPr>
+            <a:spLocks noGrp="1"/>
+          </p:cNvSpPr>
+          <p:nvPr>
+            <p:ph idx="1"/>
+          </p:nvPr>
+        </p:nvSpPr>
+        <p:spPr/>
+        <p:txBody>
+          <a:bodyPr/>
+          <a:lstStyle/>
+          <a:p>
+            <a:r>
+              <a:rPr lang="en-US" dirty="0"/>
+              <a:t>Which days/months have small artists historically performed well on in terms of streams and % share of total stream?</a:t>
+            </a:r>
+          </a:p>
+          <a:p>
+            <a:r>
+              <a:rPr lang="en-US" dirty="0"/>
+              <a:t>Which days/months have had the most album/single releases (requires additional data)</a:t>
+            </a:r>
+          </a:p>
+          <a:p>
+            <a:endParaRPr lang="en-US" dirty="0"/>
+          </a:p>
+          <a:p>
+            <a:endParaRPr lang="en-US" dirty="0"/>
+          </a:p>
+        </p:txBody>
+      </p:sp>
+    </p:spTree>
+    <p:extLst>
+      <p:ext uri="{BB962C8B-B14F-4D97-AF65-F5344CB8AC3E}">
+        <p14:creationId xmlns:p14="http://schemas.microsoft.com/office/powerpoint/2010/main" val="3493089274"/>
       </p:ext>
     </p:extLst>
   </p:cSld>
@@ -4709,7 +5408,7 @@
           <a:p>
             <a:r>
               <a:rPr lang="en-US" sz="2400" dirty="0"/>
-              <a:t>Avg weekly music streams went down after the CoVID-19 outbreak started in 2020</a:t>
+              <a:t>Avg weekly music streams on Top 200 went down after the CoVID-19 outbreak started in 2020</a:t>
             </a:r>
           </a:p>
         </p:txBody>
@@ -4736,8 +5435,8 @@
         </p:blipFill>
         <p:spPr>
           <a:xfrm>
-            <a:off x="2542949" y="1690551"/>
-            <a:ext cx="8096047" cy="4028017"/>
+            <a:off x="1795243" y="1617133"/>
+            <a:ext cx="8774896" cy="4365764"/>
           </a:xfrm>
           <a:prstGeom prst="rect">
             <a:avLst/>
@@ -4779,7 +5478,7 @@
           <p:cNvPr id="2" name="Title 1">
             <a:extLst>
               <a:ext uri="{FF2B5EF4-FFF2-40B4-BE49-F238E27FC236}">
-                <a16:creationId xmlns:a16="http://schemas.microsoft.com/office/drawing/2014/main" id="{1FD082DB-5337-4225-84B1-627CBBE8C087}"/>
+                <a16:creationId xmlns:a16="http://schemas.microsoft.com/office/drawing/2014/main" id="{F84BB8E5-9912-4E57-9D74-C2A7BBFC3F6B}"/>
               </a:ext>
             </a:extLst>
           </p:cNvPr>
@@ -4790,26 +5489,31 @@
             <p:ph type="title"/>
           </p:nvPr>
         </p:nvSpPr>
-        <p:spPr/>
+        <p:spPr>
+          <a:xfrm>
+            <a:off x="1191237" y="808057"/>
+            <a:ext cx="9378903" cy="559854"/>
+          </a:xfrm>
+        </p:spPr>
         <p:txBody>
           <a:bodyPr>
-            <a:normAutofit/>
+            <a:noAutofit/>
           </a:bodyPr>
           <a:lstStyle/>
           <a:p>
             <a:r>
               <a:rPr lang="en-US" sz="2400" dirty="0"/>
-              <a:t>Fridays and Saturdays have the highest average streams </a:t>
+              <a:t>Majority of the artists had an annual stream count in 0-100M range</a:t>
             </a:r>
           </a:p>
         </p:txBody>
       </p:sp>
       <p:pic>
         <p:nvPicPr>
-          <p:cNvPr id="4" name="Picture 3">
+          <p:cNvPr id="6" name="Picture 5">
             <a:extLst>
               <a:ext uri="{FF2B5EF4-FFF2-40B4-BE49-F238E27FC236}">
-                <a16:creationId xmlns:a16="http://schemas.microsoft.com/office/drawing/2014/main" id="{E2994B70-B967-459D-83C4-A2714B93BC52}"/>
+                <a16:creationId xmlns:a16="http://schemas.microsoft.com/office/drawing/2014/main" id="{4C0DC4BB-49A4-434C-BF81-5C732AABA31D}"/>
               </a:ext>
             </a:extLst>
           </p:cNvPr>
@@ -4826,8 +5530,8 @@
         </p:blipFill>
         <p:spPr>
           <a:xfrm>
-            <a:off x="2682200" y="1373764"/>
-            <a:ext cx="7817546" cy="4110471"/>
+            <a:off x="1757373" y="1367911"/>
+            <a:ext cx="8812766" cy="4682032"/>
           </a:xfrm>
           <a:prstGeom prst="rect">
             <a:avLst/>
@@ -4837,7 +5541,7 @@
     </p:spTree>
     <p:extLst>
       <p:ext uri="{BB962C8B-B14F-4D97-AF65-F5344CB8AC3E}">
-        <p14:creationId xmlns:p14="http://schemas.microsoft.com/office/powerpoint/2010/main" val="2500121043"/>
+        <p14:creationId xmlns:p14="http://schemas.microsoft.com/office/powerpoint/2010/main" val="1759530921"/>
       </p:ext>
     </p:extLst>
   </p:cSld>
@@ -4869,7 +5573,7 @@
           <p:cNvPr id="2" name="Title 1">
             <a:extLst>
               <a:ext uri="{FF2B5EF4-FFF2-40B4-BE49-F238E27FC236}">
-                <a16:creationId xmlns:a16="http://schemas.microsoft.com/office/drawing/2014/main" id="{5303B560-6710-4277-B741-7E4E5B67CF4E}"/>
+                <a16:creationId xmlns:a16="http://schemas.microsoft.com/office/drawing/2014/main" id="{338F6D80-018A-471E-AC52-6938B4520166}"/>
               </a:ext>
             </a:extLst>
           </p:cNvPr>
@@ -4882,29 +5586,29 @@
         </p:nvSpPr>
         <p:spPr>
           <a:xfrm>
-            <a:off x="2611808" y="808056"/>
-            <a:ext cx="7958331" cy="673611"/>
+            <a:off x="2611808" y="808057"/>
+            <a:ext cx="7958331" cy="433514"/>
           </a:xfrm>
         </p:spPr>
         <p:txBody>
           <a:bodyPr>
-            <a:normAutofit fontScale="90000"/>
+            <a:normAutofit/>
           </a:bodyPr>
           <a:lstStyle/>
           <a:p>
             <a:r>
               <a:rPr lang="en-US" sz="2400" dirty="0"/>
-              <a:t>Fridays, Saturdays, and Mondays were the days with most new entries into the top 200 chart</a:t>
+              <a:t>Streaming giants</a:t>
             </a:r>
           </a:p>
         </p:txBody>
       </p:sp>
       <p:pic>
         <p:nvPicPr>
-          <p:cNvPr id="4" name="Picture 3">
+          <p:cNvPr id="5" name="Picture 4">
             <a:extLst>
               <a:ext uri="{FF2B5EF4-FFF2-40B4-BE49-F238E27FC236}">
-                <a16:creationId xmlns:a16="http://schemas.microsoft.com/office/drawing/2014/main" id="{7604B2E8-C187-475F-BA68-0FC60345CAC3}"/>
+                <a16:creationId xmlns:a16="http://schemas.microsoft.com/office/drawing/2014/main" id="{A2CCE543-5B09-4789-83F6-4FCC976FB3AA}"/>
               </a:ext>
             </a:extLst>
           </p:cNvPr>
@@ -4921,8 +5625,8 @@
         </p:blipFill>
         <p:spPr>
           <a:xfrm>
-            <a:off x="2248464" y="1651150"/>
-            <a:ext cx="8321675" cy="4466015"/>
+            <a:off x="2298583" y="1329777"/>
+            <a:ext cx="8271556" cy="4178415"/>
           </a:xfrm>
           <a:prstGeom prst="rect">
             <a:avLst/>
@@ -4932,7 +5636,7 @@
     </p:spTree>
     <p:extLst>
       <p:ext uri="{BB962C8B-B14F-4D97-AF65-F5344CB8AC3E}">
-        <p14:creationId xmlns:p14="http://schemas.microsoft.com/office/powerpoint/2010/main" val="1681012793"/>
+        <p14:creationId xmlns:p14="http://schemas.microsoft.com/office/powerpoint/2010/main" val="307236770"/>
       </p:ext>
     </p:extLst>
   </p:cSld>
@@ -4964,7 +5668,7 @@
           <p:cNvPr id="2" name="Title 1">
             <a:extLst>
               <a:ext uri="{FF2B5EF4-FFF2-40B4-BE49-F238E27FC236}">
-                <a16:creationId xmlns:a16="http://schemas.microsoft.com/office/drawing/2014/main" id="{47B5665C-A44E-494A-A95B-7294A8C877CA}"/>
+                <a16:creationId xmlns:a16="http://schemas.microsoft.com/office/drawing/2014/main" id="{15EA1C3B-88D4-4D22-97FB-D4EC9D29A238}"/>
               </a:ext>
             </a:extLst>
           </p:cNvPr>
@@ -4975,44 +5679,59 @@
             <p:ph type="title"/>
           </p:nvPr>
         </p:nvSpPr>
-        <p:spPr/>
-        <p:txBody>
-          <a:bodyPr/>
-          <a:lstStyle/>
-          <a:p>
-            <a:endParaRPr lang="en-US"/>
-          </a:p>
-        </p:txBody>
-      </p:sp>
-      <p:sp>
-        <p:nvSpPr>
-          <p:cNvPr id="3" name="Content Placeholder 2">
+        <p:spPr>
+          <a:xfrm>
+            <a:off x="2611808" y="808057"/>
+            <a:ext cx="7958331" cy="483848"/>
+          </a:xfrm>
+        </p:spPr>
+        <p:txBody>
+          <a:bodyPr>
+            <a:normAutofit/>
+          </a:bodyPr>
+          <a:lstStyle/>
+          <a:p>
+            <a:r>
+              <a:rPr lang="en-US" sz="2400" dirty="0"/>
+              <a:t>There were ‘big’ artists in the bottom 20 as well</a:t>
+            </a:r>
+          </a:p>
+        </p:txBody>
+      </p:sp>
+      <p:pic>
+        <p:nvPicPr>
+          <p:cNvPr id="5" name="Picture 4">
             <a:extLst>
               <a:ext uri="{FF2B5EF4-FFF2-40B4-BE49-F238E27FC236}">
-                <a16:creationId xmlns:a16="http://schemas.microsoft.com/office/drawing/2014/main" id="{F38B425E-9911-4A78-9B54-291068994123}"/>
+                <a16:creationId xmlns:a16="http://schemas.microsoft.com/office/drawing/2014/main" id="{ED8B2B4A-0CEC-4B50-ACB8-43546F584AF7}"/>
               </a:ext>
             </a:extLst>
           </p:cNvPr>
-          <p:cNvSpPr>
-            <a:spLocks noGrp="1"/>
-          </p:cNvSpPr>
-          <p:nvPr>
-            <p:ph idx="1"/>
-          </p:nvPr>
-        </p:nvSpPr>
-        <p:spPr/>
-        <p:txBody>
-          <a:bodyPr/>
-          <a:lstStyle/>
-          <a:p>
-            <a:endParaRPr lang="en-US"/>
-          </a:p>
-        </p:txBody>
-      </p:sp>
+          <p:cNvPicPr>
+            <a:picLocks noChangeAspect="1"/>
+          </p:cNvPicPr>
+          <p:nvPr/>
+        </p:nvPicPr>
+        <p:blipFill>
+          <a:blip r:embed="rId2"/>
+          <a:stretch>
+            <a:fillRect/>
+          </a:stretch>
+        </p:blipFill>
+        <p:spPr>
+          <a:xfrm>
+            <a:off x="2248250" y="1266738"/>
+            <a:ext cx="8321889" cy="4280866"/>
+          </a:xfrm>
+          <a:prstGeom prst="rect">
+            <a:avLst/>
+          </a:prstGeom>
+        </p:spPr>
+      </p:pic>
     </p:spTree>
     <p:extLst>
       <p:ext uri="{BB962C8B-B14F-4D97-AF65-F5344CB8AC3E}">
-        <p14:creationId xmlns:p14="http://schemas.microsoft.com/office/powerpoint/2010/main" val="2355301225"/>
+        <p14:creationId xmlns:p14="http://schemas.microsoft.com/office/powerpoint/2010/main" val="1912681136"/>
       </p:ext>
     </p:extLst>
   </p:cSld>
@@ -5044,7 +5763,7 @@
           <p:cNvPr id="2" name="Title 1">
             <a:extLst>
               <a:ext uri="{FF2B5EF4-FFF2-40B4-BE49-F238E27FC236}">
-                <a16:creationId xmlns:a16="http://schemas.microsoft.com/office/drawing/2014/main" id="{326F0D8F-921C-4EF5-8FD1-72514197810D}"/>
+                <a16:creationId xmlns:a16="http://schemas.microsoft.com/office/drawing/2014/main" id="{1FD082DB-5337-4225-84B1-627CBBE8C087}"/>
               </a:ext>
             </a:extLst>
           </p:cNvPr>
@@ -5055,44 +5774,271 @@
             <p:ph type="title"/>
           </p:nvPr>
         </p:nvSpPr>
-        <p:spPr/>
-        <p:txBody>
-          <a:bodyPr/>
-          <a:lstStyle/>
-          <a:p>
-            <a:endParaRPr lang="en-US"/>
-          </a:p>
-        </p:txBody>
-      </p:sp>
-      <p:sp>
-        <p:nvSpPr>
-          <p:cNvPr id="3" name="Content Placeholder 2">
+        <p:spPr>
+          <a:xfrm>
+            <a:off x="2611808" y="808057"/>
+            <a:ext cx="7958331" cy="538614"/>
+          </a:xfrm>
+        </p:spPr>
+        <p:txBody>
+          <a:bodyPr>
+            <a:normAutofit/>
+          </a:bodyPr>
+          <a:lstStyle/>
+          <a:p>
+            <a:r>
+              <a:rPr lang="en-US" sz="2400" dirty="0"/>
+              <a:t>Fridays and Saturdays have the highest average streams </a:t>
+            </a:r>
+          </a:p>
+        </p:txBody>
+      </p:sp>
+      <p:pic>
+        <p:nvPicPr>
+          <p:cNvPr id="3" name="Picture 2">
             <a:extLst>
               <a:ext uri="{FF2B5EF4-FFF2-40B4-BE49-F238E27FC236}">
-                <a16:creationId xmlns:a16="http://schemas.microsoft.com/office/drawing/2014/main" id="{4F86F463-E519-4991-8BD7-130AF45CAC5D}"/>
+                <a16:creationId xmlns:a16="http://schemas.microsoft.com/office/drawing/2014/main" id="{B8CE9536-84F4-4E5F-8F24-4CDF06327EF7}"/>
               </a:ext>
             </a:extLst>
           </p:cNvPr>
-          <p:cNvSpPr>
-            <a:spLocks noGrp="1"/>
-          </p:cNvSpPr>
-          <p:nvPr>
-            <p:ph idx="1"/>
-          </p:nvPr>
-        </p:nvSpPr>
-        <p:spPr/>
-        <p:txBody>
-          <a:bodyPr/>
-          <a:lstStyle/>
-          <a:p>
-            <a:endParaRPr lang="en-US"/>
-          </a:p>
-        </p:txBody>
-      </p:sp>
+          <p:cNvPicPr>
+            <a:picLocks noChangeAspect="1"/>
+          </p:cNvPicPr>
+          <p:nvPr/>
+        </p:nvPicPr>
+        <p:blipFill>
+          <a:blip r:embed="rId2"/>
+          <a:stretch>
+            <a:fillRect/>
+          </a:stretch>
+        </p:blipFill>
+        <p:spPr>
+          <a:xfrm>
+            <a:off x="2023068" y="1465467"/>
+            <a:ext cx="8547071" cy="4576087"/>
+          </a:xfrm>
+          <a:prstGeom prst="rect">
+            <a:avLst/>
+          </a:prstGeom>
+        </p:spPr>
+      </p:pic>
     </p:spTree>
     <p:extLst>
       <p:ext uri="{BB962C8B-B14F-4D97-AF65-F5344CB8AC3E}">
-        <p14:creationId xmlns:p14="http://schemas.microsoft.com/office/powerpoint/2010/main" val="1049488092"/>
+        <p14:creationId xmlns:p14="http://schemas.microsoft.com/office/powerpoint/2010/main" val="2500121043"/>
+      </p:ext>
+    </p:extLst>
+  </p:cSld>
+  <p:clrMapOvr>
+    <a:masterClrMapping/>
+  </p:clrMapOvr>
+</p:sld>
+</file>
+
+<file path=ppt/slides/slide8.xml><?xml version="1.0" encoding="utf-8"?>
+<p:sld xmlns:a="http://schemas.openxmlformats.org/drawingml/2006/main" xmlns:r="http://schemas.openxmlformats.org/officeDocument/2006/relationships" xmlns:p="http://schemas.openxmlformats.org/presentationml/2006/main">
+  <p:cSld>
+    <p:spTree>
+      <p:nvGrpSpPr>
+        <p:cNvPr id="1" name=""/>
+        <p:cNvGrpSpPr/>
+        <p:nvPr/>
+      </p:nvGrpSpPr>
+      <p:grpSpPr>
+        <a:xfrm>
+          <a:off x="0" y="0"/>
+          <a:ext cx="0" cy="0"/>
+          <a:chOff x="0" y="0"/>
+          <a:chExt cx="0" cy="0"/>
+        </a:xfrm>
+      </p:grpSpPr>
+      <p:sp>
+        <p:nvSpPr>
+          <p:cNvPr id="2" name="Title 1">
+            <a:extLst>
+              <a:ext uri="{FF2B5EF4-FFF2-40B4-BE49-F238E27FC236}">
+                <a16:creationId xmlns:a16="http://schemas.microsoft.com/office/drawing/2014/main" id="{5303B560-6710-4277-B741-7E4E5B67CF4E}"/>
+              </a:ext>
+            </a:extLst>
+          </p:cNvPr>
+          <p:cNvSpPr>
+            <a:spLocks noGrp="1"/>
+          </p:cNvSpPr>
+          <p:nvPr>
+            <p:ph type="title"/>
+          </p:nvPr>
+        </p:nvSpPr>
+        <p:spPr>
+          <a:xfrm>
+            <a:off x="2611808" y="808056"/>
+            <a:ext cx="7958331" cy="673611"/>
+          </a:xfrm>
+        </p:spPr>
+        <p:txBody>
+          <a:bodyPr>
+            <a:normAutofit fontScale="90000"/>
+          </a:bodyPr>
+          <a:lstStyle/>
+          <a:p>
+            <a:r>
+              <a:rPr lang="en-US" sz="2400" dirty="0"/>
+              <a:t>Fridays, Saturdays, and Mondays were the days with highest percent of new entries into the top 200 chart</a:t>
+            </a:r>
+          </a:p>
+        </p:txBody>
+      </p:sp>
+      <p:pic>
+        <p:nvPicPr>
+          <p:cNvPr id="4" name="Picture 3">
+            <a:extLst>
+              <a:ext uri="{FF2B5EF4-FFF2-40B4-BE49-F238E27FC236}">
+                <a16:creationId xmlns:a16="http://schemas.microsoft.com/office/drawing/2014/main" id="{7604B2E8-C187-475F-BA68-0FC60345CAC3}"/>
+              </a:ext>
+            </a:extLst>
+          </p:cNvPr>
+          <p:cNvPicPr>
+            <a:picLocks noChangeAspect="1"/>
+          </p:cNvPicPr>
+          <p:nvPr/>
+        </p:nvPicPr>
+        <p:blipFill>
+          <a:blip r:embed="rId2"/>
+          <a:stretch>
+            <a:fillRect/>
+          </a:stretch>
+        </p:blipFill>
+        <p:spPr>
+          <a:xfrm>
+            <a:off x="2248464" y="1651150"/>
+            <a:ext cx="8321675" cy="4466015"/>
+          </a:xfrm>
+          <a:prstGeom prst="rect">
+            <a:avLst/>
+          </a:prstGeom>
+        </p:spPr>
+      </p:pic>
+    </p:spTree>
+    <p:extLst>
+      <p:ext uri="{BB962C8B-B14F-4D97-AF65-F5344CB8AC3E}">
+        <p14:creationId xmlns:p14="http://schemas.microsoft.com/office/powerpoint/2010/main" val="1681012793"/>
+      </p:ext>
+    </p:extLst>
+  </p:cSld>
+  <p:clrMapOvr>
+    <a:masterClrMapping/>
+  </p:clrMapOvr>
+</p:sld>
+</file>
+
+<file path=ppt/slides/slide9.xml><?xml version="1.0" encoding="utf-8"?>
+<p:sld xmlns:a="http://schemas.openxmlformats.org/drawingml/2006/main" xmlns:r="http://schemas.openxmlformats.org/officeDocument/2006/relationships" xmlns:p="http://schemas.openxmlformats.org/presentationml/2006/main">
+  <p:cSld>
+    <p:spTree>
+      <p:nvGrpSpPr>
+        <p:cNvPr id="1" name=""/>
+        <p:cNvGrpSpPr/>
+        <p:nvPr/>
+      </p:nvGrpSpPr>
+      <p:grpSpPr>
+        <a:xfrm>
+          <a:off x="0" y="0"/>
+          <a:ext cx="0" cy="0"/>
+          <a:chOff x="0" y="0"/>
+          <a:chExt cx="0" cy="0"/>
+        </a:xfrm>
+      </p:grpSpPr>
+      <p:sp>
+        <p:nvSpPr>
+          <p:cNvPr id="2" name="Title 1">
+            <a:extLst>
+              <a:ext uri="{FF2B5EF4-FFF2-40B4-BE49-F238E27FC236}">
+                <a16:creationId xmlns:a16="http://schemas.microsoft.com/office/drawing/2014/main" id="{47B5665C-A44E-494A-A95B-7294A8C877CA}"/>
+              </a:ext>
+            </a:extLst>
+          </p:cNvPr>
+          <p:cNvSpPr>
+            <a:spLocks noGrp="1"/>
+          </p:cNvSpPr>
+          <p:nvPr>
+            <p:ph type="title"/>
+          </p:nvPr>
+        </p:nvSpPr>
+        <p:spPr>
+          <a:xfrm>
+            <a:off x="2172750" y="808057"/>
+            <a:ext cx="8397390" cy="836185"/>
+          </a:xfrm>
+        </p:spPr>
+        <p:txBody>
+          <a:bodyPr>
+            <a:noAutofit/>
+          </a:bodyPr>
+          <a:lstStyle/>
+          <a:p>
+            <a:r>
+              <a:rPr lang="en-US" sz="2400" dirty="0"/>
+              <a:t>Pop Smoke album: 7/3/20; Juice </a:t>
+            </a:r>
+            <a:r>
+              <a:rPr lang="en-US" sz="2400" dirty="0" err="1"/>
+              <a:t>Wrld</a:t>
+            </a:r>
+            <a:r>
+              <a:rPr lang="en-US" sz="2400" dirty="0"/>
+              <a:t> album: 7/10/20;</a:t>
+            </a:r>
+            <a:br>
+              <a:rPr lang="en-US" sz="2400" dirty="0"/>
+            </a:br>
+            <a:r>
+              <a:rPr lang="en-US" sz="2400" dirty="0"/>
+              <a:t>Taylor Swift album: 7/24/20</a:t>
+            </a:r>
+            <a:br>
+              <a:rPr lang="en-US" sz="2400" dirty="0"/>
+            </a:br>
+            <a:r>
+              <a:rPr lang="en-US" sz="2400" dirty="0"/>
+              <a:t>   </a:t>
+            </a:r>
+          </a:p>
+        </p:txBody>
+      </p:sp>
+      <p:pic>
+        <p:nvPicPr>
+          <p:cNvPr id="6" name="Picture 5">
+            <a:extLst>
+              <a:ext uri="{FF2B5EF4-FFF2-40B4-BE49-F238E27FC236}">
+                <a16:creationId xmlns:a16="http://schemas.microsoft.com/office/drawing/2014/main" id="{86F14B21-E09B-4B8D-9129-1BEA90DCCB08}"/>
+              </a:ext>
+            </a:extLst>
+          </p:cNvPr>
+          <p:cNvPicPr>
+            <a:picLocks noChangeAspect="1"/>
+          </p:cNvPicPr>
+          <p:nvPr/>
+        </p:nvPicPr>
+        <p:blipFill>
+          <a:blip r:embed="rId2"/>
+          <a:stretch>
+            <a:fillRect/>
+          </a:stretch>
+        </p:blipFill>
+        <p:spPr>
+          <a:xfrm>
+            <a:off x="2038525" y="1644242"/>
+            <a:ext cx="8531615" cy="4418979"/>
+          </a:xfrm>
+          <a:prstGeom prst="rect">
+            <a:avLst/>
+          </a:prstGeom>
+        </p:spPr>
+      </p:pic>
+    </p:spTree>
+    <p:extLst>
+      <p:ext uri="{BB962C8B-B14F-4D97-AF65-F5344CB8AC3E}">
+        <p14:creationId xmlns:p14="http://schemas.microsoft.com/office/powerpoint/2010/main" val="2355301225"/>
       </p:ext>
     </p:extLst>
   </p:cSld>

</xml_diff>